<commit_message>
Folie ulepszone po sobocie
</commit_message>
<xml_diff>
--- a/wks/A_0_agenda.pptx
+++ b/wks/A_0_agenda.pptx
@@ -5,20 +5,19 @@
     <p:sldMasterId id="2147483927" r:id="rId1"/>
   </p:sldMasterIdLst>
   <p:notesMasterIdLst>
-    <p:notesMasterId r:id="rId5"/>
+    <p:notesMasterId r:id="rId4"/>
   </p:notesMasterIdLst>
   <p:handoutMasterIdLst>
-    <p:handoutMasterId r:id="rId6"/>
+    <p:handoutMasterId r:id="rId5"/>
   </p:handoutMasterIdLst>
   <p:sldIdLst>
     <p:sldId id="311" r:id="rId2"/>
     <p:sldId id="340" r:id="rId3"/>
-    <p:sldId id="341" r:id="rId4"/>
   </p:sldIdLst>
   <p:sldSz cx="9906000" cy="6858000" type="A4"/>
   <p:notesSz cx="6896100" cy="10033000"/>
   <p:custDataLst>
-    <p:tags r:id="rId7"/>
+    <p:tags r:id="rId6"/>
   </p:custDataLst>
   <p:defaultTextStyle>
     <a:defPPr>
@@ -347,7 +346,7 @@
             <a:fld id="{2FB4FF29-EE9A-4D47-9F1A-289A80693C0F}" type="datetimeFigureOut">
               <a:rPr lang="en-US" smtClean="0"/>
               <a:pPr/>
-              <a:t>5/29/2015</a:t>
+              <a:t>6/1/2015</a:t>
             </a:fld>
             <a:endParaRPr lang="en-US" dirty="0"/>
           </a:p>
@@ -823,88 +822,6 @@
               <a:rPr lang="en-US" smtClean="0"/>
               <a:pPr/>
               <a:t>2</a:t>
-            </a:fld>
-            <a:endParaRPr lang="en-US" dirty="0"/>
-          </a:p>
-        </p:txBody>
-      </p:sp>
-    </p:spTree>
-  </p:cSld>
-  <p:clrMapOvr>
-    <a:masterClrMapping/>
-  </p:clrMapOvr>
-</p:notes>
-</file>
-
-<file path=ppt/notesSlides/notesSlide3.xml><?xml version="1.0" encoding="utf-8"?>
-<p:notes xmlns:a="http://schemas.openxmlformats.org/drawingml/2006/main" xmlns:r="http://schemas.openxmlformats.org/officeDocument/2006/relationships" xmlns:p="http://schemas.openxmlformats.org/presentationml/2006/main">
-  <p:cSld>
-    <p:spTree>
-      <p:nvGrpSpPr>
-        <p:cNvPr id="1" name=""/>
-        <p:cNvGrpSpPr/>
-        <p:nvPr/>
-      </p:nvGrpSpPr>
-      <p:grpSpPr>
-        <a:xfrm>
-          <a:off x="0" y="0"/>
-          <a:ext cx="0" cy="0"/>
-          <a:chOff x="0" y="0"/>
-          <a:chExt cx="0" cy="0"/>
-        </a:xfrm>
-      </p:grpSpPr>
-      <p:sp>
-        <p:nvSpPr>
-          <p:cNvPr id="2" name="Slide Image Placeholder 1"/>
-          <p:cNvSpPr>
-            <a:spLocks noGrp="1" noRot="1" noChangeAspect="1"/>
-          </p:cNvSpPr>
-          <p:nvPr>
-            <p:ph type="sldImg"/>
-          </p:nvPr>
-        </p:nvSpPr>
-        <p:spPr/>
-      </p:sp>
-      <p:sp>
-        <p:nvSpPr>
-          <p:cNvPr id="3" name="Notes Placeholder 2"/>
-          <p:cNvSpPr>
-            <a:spLocks noGrp="1"/>
-          </p:cNvSpPr>
-          <p:nvPr>
-            <p:ph type="body" idx="1"/>
-          </p:nvPr>
-        </p:nvSpPr>
-        <p:spPr/>
-        <p:txBody>
-          <a:bodyPr>
-            <a:normAutofit/>
-          </a:bodyPr>
-          <a:lstStyle/>
-          <a:p>
-            <a:endParaRPr lang="en-US" dirty="0"/>
-          </a:p>
-        </p:txBody>
-      </p:sp>
-      <p:sp>
-        <p:nvSpPr>
-          <p:cNvPr id="4" name="Slide Number Placeholder 3"/>
-          <p:cNvSpPr>
-            <a:spLocks noGrp="1"/>
-          </p:cNvSpPr>
-          <p:nvPr>
-            <p:ph type="sldNum" sz="quarter" idx="10"/>
-          </p:nvPr>
-        </p:nvSpPr>
-        <p:spPr/>
-        <p:txBody>
-          <a:bodyPr/>
-          <a:lstStyle/>
-          <a:p>
-            <a:fld id="{71E7D22E-2FCF-4181-8686-08BDCDF94062}" type="slidenum">
-              <a:rPr lang="en-US" smtClean="0"/>
-              <a:pPr/>
-              <a:t>3</a:t>
             </a:fld>
             <a:endParaRPr lang="en-US" dirty="0"/>
           </a:p>
@@ -5146,7 +5063,7 @@
           <a:p>
             <a:r>
               <a:rPr lang="de-DE" smtClean="0"/>
-              <a:t>A_0_plan.pptx</a:t>
+              <a:t>A_0_agenda.pptx</a:t>
             </a:r>
             <a:endParaRPr lang="de-DE" dirty="0"/>
           </a:p>
@@ -5300,7 +5217,7 @@
           <a:p>
             <a:r>
               <a:rPr lang="de-DE" smtClean="0"/>
-              <a:t>A_0_plan.pptx</a:t>
+              <a:t>A_0_agenda.pptx</a:t>
             </a:r>
             <a:endParaRPr lang="de-DE" dirty="0"/>
           </a:p>
@@ -5614,7 +5531,7 @@
           <a:p>
             <a:r>
               <a:rPr lang="de-DE" smtClean="0"/>
-              <a:t>A_0_plan.pptx</a:t>
+              <a:t>A_0_agenda.pptx</a:t>
             </a:r>
             <a:endParaRPr lang="de-DE" dirty="0"/>
           </a:p>
@@ -5917,7 +5834,7 @@
           <a:p>
             <a:r>
               <a:rPr lang="de-DE" smtClean="0"/>
-              <a:t>A_0_plan.pptx</a:t>
+              <a:t>A_0_agenda.pptx</a:t>
             </a:r>
             <a:endParaRPr lang="de-DE" dirty="0"/>
           </a:p>
@@ -6078,7 +5995,7 @@
           <a:p>
             <a:r>
               <a:rPr lang="de-DE" smtClean="0"/>
-              <a:t>A_0_plan.pptx</a:t>
+              <a:t>A_0_agenda.pptx</a:t>
             </a:r>
             <a:endParaRPr lang="de-DE" dirty="0"/>
           </a:p>
@@ -6466,7 +6383,7 @@
           <a:p>
             <a:r>
               <a:rPr lang="de-DE" smtClean="0"/>
-              <a:t>A_0_plan.pptx</a:t>
+              <a:t>A_0_agenda.pptx</a:t>
             </a:r>
             <a:endParaRPr lang="de-DE"/>
           </a:p>
@@ -7503,13 +7420,6 @@
               <a:rPr lang="pl-PL" sz="6000" b="1" dirty="0" smtClean="0"/>
               <a:t>Agenda WKS RoboCap</a:t>
             </a:r>
-            <a:br>
-              <a:rPr lang="pl-PL" sz="6000" b="1" dirty="0" smtClean="0"/>
-            </a:br>
-            <a:r>
-              <a:rPr lang="pl-PL" sz="6000" b="1" dirty="0" smtClean="0"/>
-              <a:t>0. podział na grupy</a:t>
-            </a:r>
             <a:endParaRPr lang="en-US" sz="6000" b="1" dirty="0"/>
           </a:p>
         </p:txBody>
@@ -7618,7 +7528,7 @@
                 <a:latin typeface="Arial" pitchFamily="34" charset="0"/>
                 <a:cs typeface="Arial" pitchFamily="34" charset="0"/>
               </a:rPr>
-              <a:t>Plan podstawowy</a:t>
+              <a:t>Agenda</a:t>
             </a:r>
             <a:endParaRPr lang="en-GB" dirty="0">
               <a:latin typeface="Arial" pitchFamily="34" charset="0"/>
@@ -7668,7 +7578,7 @@
           <a:p>
             <a:r>
               <a:rPr lang="en-GB" smtClean="0"/>
-              <a:t>A_0_plan.pptx</a:t>
+              <a:t>A_0_agenda.pptx</a:t>
             </a:r>
             <a:endParaRPr lang="en-GB" dirty="0"/>
           </a:p>
@@ -7739,7 +7649,33 @@
                 <a:spcPct val="20000"/>
               </a:spcBef>
               <a:spcAft>
-                <a:spcPts val="1200"/>
+                <a:spcPts val="600"/>
+              </a:spcAft>
+              <a:buClrTx/>
+              <a:buFont typeface="+mj-lt"/>
+              <a:buAutoNum type="arabicPeriod"/>
+            </a:pPr>
+            <a:r>
+              <a:rPr lang="pl-PL" sz="2000" b="1" dirty="0" smtClean="0">
+                <a:solidFill>
+                  <a:sysClr val="windowText" lastClr="000000"/>
+                </a:solidFill>
+                <a:latin typeface="+mj-lt"/>
+                <a:cs typeface="Courier New" pitchFamily="49" charset="0"/>
+              </a:rPr>
+              <a:t>Podział na grupy 4 osobowe</a:t>
+            </a:r>
+          </a:p>
+          <a:p>
+            <a:pPr marL="457200" indent="-457200" defTabSz="457200">
+              <a:lnSpc>
+                <a:spcPct val="100000"/>
+              </a:lnSpc>
+              <a:spcBef>
+                <a:spcPct val="20000"/>
+              </a:spcBef>
+              <a:spcAft>
+                <a:spcPts val="600"/>
               </a:spcAft>
               <a:buClrTx/>
               <a:buFont typeface="+mj-lt"/>
@@ -7782,7 +7718,63 @@
                 <a:spcPct val="20000"/>
               </a:spcBef>
               <a:spcAft>
-                <a:spcPts val="1200"/>
+                <a:spcPts val="600"/>
+              </a:spcAft>
+              <a:buClrTx/>
+              <a:buFont typeface="+mj-lt"/>
+              <a:buAutoNum type="arabicPeriod"/>
+            </a:pPr>
+            <a:r>
+              <a:rPr lang="pl-PL" sz="2000" b="1" dirty="0" err="1" smtClean="0">
+                <a:solidFill>
+                  <a:sysClr val="windowText" lastClr="000000"/>
+                </a:solidFill>
+                <a:latin typeface="+mj-lt"/>
+                <a:cs typeface="Courier New" pitchFamily="49" charset="0"/>
+              </a:rPr>
+              <a:t>Arduino</a:t>
+            </a:r>
+            <a:r>
+              <a:rPr lang="pl-PL" sz="2000" b="1" dirty="0" smtClean="0">
+                <a:solidFill>
+                  <a:sysClr val="windowText" lastClr="000000"/>
+                </a:solidFill>
+                <a:latin typeface="+mj-lt"/>
+                <a:cs typeface="Courier New" pitchFamily="49" charset="0"/>
+              </a:rPr>
+              <a:t> IDE – ćwiczenia z </a:t>
+            </a:r>
+            <a:r>
+              <a:rPr lang="pl-PL" sz="2000" b="1" dirty="0" err="1" smtClean="0">
+                <a:solidFill>
+                  <a:sysClr val="windowText" lastClr="000000"/>
+                </a:solidFill>
+                <a:latin typeface="+mj-lt"/>
+                <a:cs typeface="Courier New" pitchFamily="49" charset="0"/>
+              </a:rPr>
+              <a:t>Arduino</a:t>
+            </a:r>
+            <a:r>
+              <a:rPr lang="pl-PL" sz="2000" b="1" dirty="0" smtClean="0">
+                <a:solidFill>
+                  <a:sysClr val="windowText" lastClr="000000"/>
+                </a:solidFill>
+                <a:latin typeface="+mj-lt"/>
+                <a:cs typeface="Courier New" pitchFamily="49" charset="0"/>
+              </a:rPr>
+              <a:t> </a:t>
+            </a:r>
+          </a:p>
+          <a:p>
+            <a:pPr marL="457200" indent="-457200" defTabSz="457200">
+              <a:lnSpc>
+                <a:spcPct val="100000"/>
+              </a:lnSpc>
+              <a:spcBef>
+                <a:spcPct val="20000"/>
+              </a:spcBef>
+              <a:spcAft>
+                <a:spcPts val="600"/>
               </a:spcAft>
               <a:buClrTx/>
               <a:buFont typeface="+mj-lt"/>
@@ -7825,7 +7817,7 @@
                 <a:spcPct val="20000"/>
               </a:spcBef>
               <a:spcAft>
-                <a:spcPts val="1200"/>
+                <a:spcPts val="600"/>
               </a:spcAft>
               <a:buClrTx/>
               <a:buFont typeface="+mj-lt"/>
@@ -7839,7 +7831,7 @@
                 <a:latin typeface="+mj-lt"/>
                 <a:cs typeface="Courier New" pitchFamily="49" charset="0"/>
               </a:rPr>
-              <a:t>Arduino</a:t>
+              <a:t>CodeBlock</a:t>
             </a:r>
             <a:r>
               <a:rPr lang="pl-PL" sz="2000" b="1" dirty="0" smtClean="0">
@@ -7849,7 +7841,7 @@
                 <a:latin typeface="+mj-lt"/>
                 <a:cs typeface="Courier New" pitchFamily="49" charset="0"/>
               </a:rPr>
-              <a:t> IDE – podstawowe funkcje </a:t>
+              <a:t> IDE – ćwiczenia z </a:t>
             </a:r>
             <a:r>
               <a:rPr lang="pl-PL" sz="2000" b="1" dirty="0" err="1" smtClean="0">
@@ -7859,7 +7851,7 @@
                 <a:latin typeface="+mj-lt"/>
                 <a:cs typeface="Courier New" pitchFamily="49" charset="0"/>
               </a:rPr>
-              <a:t>Arduino</a:t>
+              <a:t>Makeblock</a:t>
             </a:r>
             <a:r>
               <a:rPr lang="pl-PL" sz="2000" b="1" dirty="0" smtClean="0">
@@ -7869,7 +7861,7 @@
                 <a:latin typeface="+mj-lt"/>
                 <a:cs typeface="Courier New" pitchFamily="49" charset="0"/>
               </a:rPr>
-              <a:t> – </a:t>
+              <a:t> (</a:t>
             </a:r>
             <a:r>
               <a:rPr lang="pl-PL" sz="2000" b="1" dirty="0" err="1" smtClean="0">
@@ -7879,7 +7871,37 @@
                 <a:latin typeface="+mj-lt"/>
                 <a:cs typeface="Courier New" pitchFamily="49" charset="0"/>
               </a:rPr>
-              <a:t>ćwieczenia</a:t>
+              <a:t>buzzer</a:t>
+            </a:r>
+            <a:r>
+              <a:rPr lang="pl-PL" sz="2000" b="1" dirty="0" smtClean="0">
+                <a:solidFill>
+                  <a:sysClr val="windowText" lastClr="000000"/>
+                </a:solidFill>
+                <a:latin typeface="+mj-lt"/>
+                <a:cs typeface="Courier New" pitchFamily="49" charset="0"/>
+              </a:rPr>
+              <a:t>, </a:t>
+            </a:r>
+            <a:r>
+              <a:rPr lang="pl-PL" sz="2000" b="1" dirty="0" err="1" smtClean="0">
+                <a:solidFill>
+                  <a:sysClr val="windowText" lastClr="000000"/>
+                </a:solidFill>
+                <a:latin typeface="+mj-lt"/>
+                <a:cs typeface="Courier New" pitchFamily="49" charset="0"/>
+              </a:rPr>
+              <a:t>IrDA</a:t>
+            </a:r>
+            <a:r>
+              <a:rPr lang="pl-PL" sz="2000" b="1" smtClean="0">
+                <a:solidFill>
+                  <a:sysClr val="windowText" lastClr="000000"/>
+                </a:solidFill>
+                <a:latin typeface="+mj-lt"/>
+                <a:cs typeface="Courier New" pitchFamily="49" charset="0"/>
+              </a:rPr>
+              <a:t>, sonar)</a:t>
             </a:r>
             <a:endParaRPr lang="pl-PL" sz="2000" b="1" dirty="0" smtClean="0">
               <a:solidFill>
@@ -7898,12 +7920,22 @@
                 <a:spcPct val="20000"/>
               </a:spcBef>
               <a:spcAft>
-                <a:spcPts val="1200"/>
+                <a:spcPts val="600"/>
               </a:spcAft>
               <a:buClrTx/>
               <a:buFont typeface="+mj-lt"/>
               <a:buAutoNum type="arabicPeriod"/>
             </a:pPr>
+            <a:r>
+              <a:rPr lang="pl-PL" sz="2000" b="1" dirty="0" smtClean="0">
+                <a:solidFill>
+                  <a:sysClr val="windowText" lastClr="000000"/>
+                </a:solidFill>
+                <a:latin typeface="+mj-lt"/>
+                <a:cs typeface="Courier New" pitchFamily="49" charset="0"/>
+              </a:rPr>
+              <a:t>Roboty </a:t>
+            </a:r>
             <a:r>
               <a:rPr lang="pl-PL" sz="2000" b="1" dirty="0" err="1" smtClean="0">
                 <a:solidFill>
@@ -7912,7 +7944,7 @@
                 <a:latin typeface="+mj-lt"/>
                 <a:cs typeface="Courier New" pitchFamily="49" charset="0"/>
               </a:rPr>
-              <a:t>CodeBlock</a:t>
+              <a:t>line</a:t>
             </a:r>
             <a:r>
               <a:rPr lang="pl-PL" sz="2000" b="1" dirty="0" smtClean="0">
@@ -7922,7 +7954,7 @@
                 <a:latin typeface="+mj-lt"/>
                 <a:cs typeface="Courier New" pitchFamily="49" charset="0"/>
               </a:rPr>
-              <a:t> IDE – proste ćwiczenia z </a:t>
+              <a:t> </a:t>
             </a:r>
             <a:r>
               <a:rPr lang="pl-PL" sz="2000" b="1" dirty="0" err="1" smtClean="0">
@@ -7932,7 +7964,7 @@
                 <a:latin typeface="+mj-lt"/>
                 <a:cs typeface="Courier New" pitchFamily="49" charset="0"/>
               </a:rPr>
-              <a:t>Makeblock</a:t>
+              <a:t>follower</a:t>
             </a:r>
             <a:endParaRPr lang="pl-PL" sz="2000" b="1" dirty="0" smtClean="0">
               <a:solidFill>
@@ -7951,7 +7983,7 @@
                 <a:spcPct val="20000"/>
               </a:spcBef>
               <a:spcAft>
-                <a:spcPts val="1200"/>
+                <a:spcPts val="600"/>
               </a:spcAft>
               <a:buClrTx/>
               <a:buFont typeface="+mj-lt"/>
@@ -7965,7 +7997,7 @@
                 <a:latin typeface="+mj-lt"/>
                 <a:cs typeface="Courier New" pitchFamily="49" charset="0"/>
               </a:rPr>
-              <a:t>Roboty </a:t>
+              <a:t>Silniki – ćwiczenia z </a:t>
             </a:r>
             <a:r>
               <a:rPr lang="pl-PL" sz="2000" b="1" dirty="0" err="1" smtClean="0">
@@ -7975,27 +8007,7 @@
                 <a:latin typeface="+mj-lt"/>
                 <a:cs typeface="Courier New" pitchFamily="49" charset="0"/>
               </a:rPr>
-              <a:t>line</a:t>
-            </a:r>
-            <a:r>
-              <a:rPr lang="pl-PL" sz="2000" b="1" dirty="0" smtClean="0">
-                <a:solidFill>
-                  <a:sysClr val="windowText" lastClr="000000"/>
-                </a:solidFill>
-                <a:latin typeface="+mj-lt"/>
-                <a:cs typeface="Courier New" pitchFamily="49" charset="0"/>
-              </a:rPr>
-              <a:t> </a:t>
-            </a:r>
-            <a:r>
-              <a:rPr lang="pl-PL" sz="2000" b="1" dirty="0" err="1" smtClean="0">
-                <a:solidFill>
-                  <a:sysClr val="windowText" lastClr="000000"/>
-                </a:solidFill>
-                <a:latin typeface="+mj-lt"/>
-                <a:cs typeface="Courier New" pitchFamily="49" charset="0"/>
-              </a:rPr>
-              <a:t>follower</a:t>
+              <a:t>Makeblock</a:t>
             </a:r>
             <a:endParaRPr lang="pl-PL" sz="2000" b="1" dirty="0" smtClean="0">
               <a:solidFill>
@@ -8014,7 +8026,7 @@
                 <a:spcPct val="20000"/>
               </a:spcBef>
               <a:spcAft>
-                <a:spcPts val="1200"/>
+                <a:spcPts val="600"/>
               </a:spcAft>
               <a:buClrTx/>
               <a:buFont typeface="+mj-lt"/>
@@ -8028,356 +8040,17 @@
                 <a:latin typeface="+mj-lt"/>
                 <a:cs typeface="Courier New" pitchFamily="49" charset="0"/>
               </a:rPr>
-              <a:t>Wykrywanie linii</a:t>
-            </a:r>
-          </a:p>
-          <a:p>
-            <a:pPr marL="457200" indent="-457200" defTabSz="457200">
-              <a:lnSpc>
-                <a:spcPct val="100000"/>
-              </a:lnSpc>
-              <a:spcBef>
-                <a:spcPct val="20000"/>
-              </a:spcBef>
-              <a:spcAft>
-                <a:spcPts val="1200"/>
-              </a:spcAft>
-              <a:buClrTx/>
-              <a:buFont typeface="+mj-lt"/>
-              <a:buAutoNum type="arabicPeriod"/>
-            </a:pPr>
-            <a:r>
-              <a:rPr lang="pl-PL" sz="2000" b="1" dirty="0" smtClean="0">
+              <a:t>Wykrywanie linii – ćwiczenia z </a:t>
+            </a:r>
+            <a:r>
+              <a:rPr lang="pl-PL" sz="2000" b="1" dirty="0" err="1" smtClean="0">
                 <a:solidFill>
                   <a:sysClr val="windowText" lastClr="000000"/>
                 </a:solidFill>
                 <a:latin typeface="+mj-lt"/>
                 <a:cs typeface="Courier New" pitchFamily="49" charset="0"/>
               </a:rPr>
-              <a:t>Silniki</a:t>
-            </a:r>
-          </a:p>
-          <a:p>
-            <a:pPr marL="457200" indent="-457200" defTabSz="457200">
-              <a:lnSpc>
-                <a:spcPct val="100000"/>
-              </a:lnSpc>
-              <a:spcBef>
-                <a:spcPct val="20000"/>
-              </a:spcBef>
-              <a:spcAft>
-                <a:spcPts val="1200"/>
-              </a:spcAft>
-              <a:buClrTx/>
-              <a:buFont typeface="+mj-lt"/>
-              <a:buAutoNum type="arabicPeriod"/>
-            </a:pPr>
-            <a:r>
-              <a:rPr lang="pl-PL" sz="2000" b="1" dirty="0" smtClean="0">
-                <a:solidFill>
-                  <a:sysClr val="windowText" lastClr="000000"/>
-                </a:solidFill>
-                <a:latin typeface="+mj-lt"/>
-                <a:cs typeface="Courier New" pitchFamily="49" charset="0"/>
-              </a:rPr>
-              <a:t>Praca w zespołach</a:t>
-            </a:r>
-          </a:p>
-          <a:p>
-            <a:pPr marL="457200" indent="-457200" defTabSz="457200">
-              <a:lnSpc>
-                <a:spcPct val="100000"/>
-              </a:lnSpc>
-              <a:spcBef>
-                <a:spcPct val="20000"/>
-              </a:spcBef>
-              <a:spcAft>
-                <a:spcPts val="1200"/>
-              </a:spcAft>
-              <a:buClrTx/>
-              <a:buFont typeface="+mj-lt"/>
-              <a:buAutoNum type="arabicPeriod"/>
-            </a:pPr>
-            <a:r>
-              <a:rPr lang="pl-PL" sz="2000" b="1" dirty="0" smtClean="0">
-                <a:solidFill>
-                  <a:sysClr val="windowText" lastClr="000000"/>
-                </a:solidFill>
-                <a:latin typeface="+mj-lt"/>
-                <a:cs typeface="Courier New" pitchFamily="49" charset="0"/>
-              </a:rPr>
-              <a:t>Zawody</a:t>
-            </a:r>
-          </a:p>
-        </p:txBody>
-      </p:sp>
-      <p:pic>
-        <p:nvPicPr>
-          <p:cNvPr id="10" name="Picture 4" descr="https://encrypted-tbn2.gstatic.com/images?q=tbn:ANd9GcSS5XD-fwsa5DO096u7zP5Rxt8qfokZ36djp-u5skB0qeeazcwI"/>
-          <p:cNvPicPr>
-            <a:picLocks noChangeAspect="1" noChangeArrowheads="1"/>
-          </p:cNvPicPr>
-          <p:nvPr/>
-        </p:nvPicPr>
-        <p:blipFill>
-          <a:blip r:embed="rId6"/>
-          <a:srcRect/>
-          <a:stretch>
-            <a:fillRect/>
-          </a:stretch>
-        </p:blipFill>
-        <p:spPr bwMode="auto">
-          <a:xfrm>
-            <a:off x="7689380" y="0"/>
-            <a:ext cx="992450" cy="992450"/>
-          </a:xfrm>
-          <a:prstGeom prst="rect">
-            <a:avLst/>
-          </a:prstGeom>
-          <a:noFill/>
-        </p:spPr>
-      </p:pic>
-      <p:sp>
-        <p:nvSpPr>
-          <p:cNvPr id="137220" name="AutoShape 4" descr="https://s3.amazonaws.com/ksr/assets/000/839/277/ed8e45bf086a57a613e7e9194eeb1742_large.png"/>
-          <p:cNvSpPr>
-            <a:spLocks noChangeAspect="1" noChangeArrowheads="1"/>
-          </p:cNvSpPr>
-          <p:nvPr/>
-        </p:nvSpPr>
-        <p:spPr bwMode="auto">
-          <a:xfrm>
-            <a:off x="155575" y="-144463"/>
-            <a:ext cx="304800" cy="304801"/>
-          </a:xfrm>
-          <a:prstGeom prst="rect">
-            <a:avLst/>
-          </a:prstGeom>
-          <a:noFill/>
-        </p:spPr>
-        <p:txBody>
-          <a:bodyPr vert="horz" wrap="square" lIns="91440" tIns="45720" rIns="91440" bIns="45720" numCol="1" anchor="t" anchorCtr="0" compatLnSpc="1">
-            <a:prstTxWarp prst="textNoShape">
-              <a:avLst/>
-            </a:prstTxWarp>
-          </a:bodyPr>
-          <a:lstStyle/>
-          <a:p>
-            <a:endParaRPr lang="en-US"/>
-          </a:p>
-        </p:txBody>
-      </p:sp>
-    </p:spTree>
-  </p:cSld>
-  <p:clrMapOvr>
-    <a:masterClrMapping/>
-  </p:clrMapOvr>
-  <p:timing>
-    <p:tnLst>
-      <p:par>
-        <p:cTn id="1" dur="indefinite" restart="never" nodeType="tmRoot"/>
-      </p:par>
-    </p:tnLst>
-  </p:timing>
-</p:sld>
-</file>
-
-<file path=ppt/slides/slide3.xml><?xml version="1.0" encoding="utf-8"?>
-<p:sld xmlns:a="http://schemas.openxmlformats.org/drawingml/2006/main" xmlns:r="http://schemas.openxmlformats.org/officeDocument/2006/relationships" xmlns:p="http://schemas.openxmlformats.org/presentationml/2006/main">
-  <p:cSld>
-    <p:spTree>
-      <p:nvGrpSpPr>
-        <p:cNvPr id="1" name=""/>
-        <p:cNvGrpSpPr/>
-        <p:nvPr/>
-      </p:nvGrpSpPr>
-      <p:grpSpPr>
-        <a:xfrm>
-          <a:off x="0" y="0"/>
-          <a:ext cx="0" cy="0"/>
-          <a:chOff x="0" y="0"/>
-          <a:chExt cx="0" cy="0"/>
-        </a:xfrm>
-      </p:grpSpPr>
-      <p:graphicFrame>
-        <p:nvGraphicFramePr>
-          <p:cNvPr id="4" name="Object 3" hidden="1"/>
-          <p:cNvGraphicFramePr>
-            <a:graphicFrameLocks noChangeAspect="1"/>
-          </p:cNvGraphicFramePr>
-          <p:nvPr/>
-        </p:nvGraphicFramePr>
-        <p:xfrm>
-          <a:off x="0" y="0"/>
-          <a:ext cx="158750" cy="158750"/>
-        </p:xfrm>
-        <a:graphic>
-          <a:graphicData uri="http://schemas.openxmlformats.org/presentationml/2006/ole">
-            <p:oleObj spid="_x0000_s261122" name="think-cell Slide" r:id="rId5" imgW="360" imgH="360" progId="">
-              <p:embed/>
-            </p:oleObj>
-          </a:graphicData>
-        </a:graphic>
-      </p:graphicFrame>
-      <p:sp>
-        <p:nvSpPr>
-          <p:cNvPr id="2" name="Titre 1"/>
-          <p:cNvSpPr>
-            <a:spLocks noGrp="1"/>
-          </p:cNvSpPr>
-          <p:nvPr>
-            <p:ph type="title"/>
-            <p:custDataLst>
-              <p:tags r:id="rId2"/>
-            </p:custDataLst>
-          </p:nvPr>
-        </p:nvSpPr>
-        <p:spPr/>
-        <p:txBody>
-          <a:bodyPr/>
-          <a:lstStyle/>
-          <a:p>
-            <a:r>
-              <a:rPr lang="pl-PL" dirty="0" smtClean="0">
-                <a:latin typeface="Arial" pitchFamily="34" charset="0"/>
-                <a:cs typeface="Arial" pitchFamily="34" charset="0"/>
-              </a:rPr>
-              <a:t>Zadania opcjonalne</a:t>
-            </a:r>
-            <a:endParaRPr lang="en-GB" dirty="0">
-              <a:latin typeface="Arial" pitchFamily="34" charset="0"/>
-              <a:cs typeface="Arial" pitchFamily="34" charset="0"/>
-            </a:endParaRPr>
-          </a:p>
-        </p:txBody>
-      </p:sp>
-      <p:sp>
-        <p:nvSpPr>
-          <p:cNvPr id="8" name="Slide Number Placeholder 7"/>
-          <p:cNvSpPr>
-            <a:spLocks noGrp="1"/>
-          </p:cNvSpPr>
-          <p:nvPr>
-            <p:ph type="sldNum" sz="quarter" idx="11"/>
-          </p:nvPr>
-        </p:nvSpPr>
-        <p:spPr/>
-        <p:txBody>
-          <a:bodyPr/>
-          <a:lstStyle/>
-          <a:p>
-            <a:fld id="{880BADDE-CEDF-4108-ADCD-25C7E5D681A5}" type="slidenum">
-              <a:rPr lang="en-GB" smtClean="0"/>
-              <a:pPr/>
-              <a:t>3</a:t>
-            </a:fld>
-            <a:endParaRPr lang="en-GB" dirty="0"/>
-          </a:p>
-        </p:txBody>
-      </p:sp>
-      <p:sp>
-        <p:nvSpPr>
-          <p:cNvPr id="9" name="Footer Placeholder 8"/>
-          <p:cNvSpPr>
-            <a:spLocks noGrp="1"/>
-          </p:cNvSpPr>
-          <p:nvPr>
-            <p:ph type="ftr" sz="quarter" idx="12"/>
-          </p:nvPr>
-        </p:nvSpPr>
-        <p:spPr/>
-        <p:txBody>
-          <a:bodyPr/>
-          <a:lstStyle/>
-          <a:p>
-            <a:r>
-              <a:rPr lang="en-GB" smtClean="0"/>
-              <a:t>A_0_plan.pptx</a:t>
-            </a:r>
-            <a:endParaRPr lang="en-GB" dirty="0"/>
-          </a:p>
-        </p:txBody>
-      </p:sp>
-      <p:sp>
-        <p:nvSpPr>
-          <p:cNvPr id="28" name="Date Placeholder 27"/>
-          <p:cNvSpPr>
-            <a:spLocks noGrp="1"/>
-          </p:cNvSpPr>
-          <p:nvPr>
-            <p:ph type="dt" sz="half" idx="10"/>
-          </p:nvPr>
-        </p:nvSpPr>
-        <p:spPr/>
-        <p:txBody>
-          <a:bodyPr/>
-          <a:lstStyle/>
-          <a:p>
-            <a:pPr defTabSz="995445" eaLnBrk="0" hangingPunct="0">
-              <a:lnSpc>
-                <a:spcPct val="90000"/>
-              </a:lnSpc>
-              <a:spcBef>
-                <a:spcPct val="10000"/>
-              </a:spcBef>
-              <a:defRPr/>
-            </a:pPr>
-            <a:r>
-              <a:rPr lang="en-US" dirty="0" smtClean="0"/>
-              <a:t>Creative Commons 4.0 license</a:t>
-            </a:r>
-            <a:endParaRPr lang="de-DE" dirty="0"/>
-          </a:p>
-        </p:txBody>
-      </p:sp>
-      <p:sp>
-        <p:nvSpPr>
-          <p:cNvPr id="14" name="Content Placeholder 7"/>
-          <p:cNvSpPr>
-            <a:spLocks noGrp="1"/>
-          </p:cNvSpPr>
-          <p:nvPr>
-            <p:ph idx="4294967295"/>
-          </p:nvPr>
-        </p:nvSpPr>
-        <p:spPr>
-          <a:xfrm>
-            <a:off x="344360" y="1484730"/>
-            <a:ext cx="8713210" cy="4752660"/>
-          </a:xfrm>
-          <a:prstGeom prst="rect">
-            <a:avLst/>
-          </a:prstGeom>
-        </p:spPr>
-        <p:txBody>
-          <a:bodyPr>
-            <a:noAutofit/>
-          </a:bodyPr>
-          <a:lstStyle/>
-          <a:p>
-            <a:pPr marL="457200" indent="-457200" defTabSz="457200">
-              <a:lnSpc>
-                <a:spcPct val="100000"/>
-              </a:lnSpc>
-              <a:spcBef>
-                <a:spcPct val="20000"/>
-              </a:spcBef>
-              <a:spcAft>
-                <a:spcPts val="1200"/>
-              </a:spcAft>
-              <a:buClrTx/>
-              <a:buFont typeface="+mj-lt"/>
-              <a:buAutoNum type="arabicPeriod"/>
-            </a:pPr>
-            <a:r>
-              <a:rPr lang="pl-PL" sz="2000" b="1" dirty="0" smtClean="0">
-                <a:solidFill>
-                  <a:sysClr val="windowText" lastClr="000000"/>
-                </a:solidFill>
-                <a:latin typeface="+mj-lt"/>
-                <a:cs typeface="Courier New" pitchFamily="49" charset="0"/>
-              </a:rPr>
-              <a:t>Budujemy własny czujnik linii.</a:t>
+              <a:t>Makeblock</a:t>
             </a:r>
             <a:endParaRPr lang="pl-PL" sz="2000" b="1" dirty="0" smtClean="0">
               <a:solidFill>
@@ -8396,7 +8069,7 @@
                 <a:spcPct val="20000"/>
               </a:spcBef>
               <a:spcAft>
-                <a:spcPts val="1200"/>
+                <a:spcPts val="600"/>
               </a:spcAft>
               <a:buClrTx/>
               <a:buFont typeface="+mj-lt"/>
@@ -8410,27 +8083,7 @@
                 <a:latin typeface="+mj-lt"/>
                 <a:cs typeface="Courier New" pitchFamily="49" charset="0"/>
               </a:rPr>
-              <a:t>Protokół 1-wire </a:t>
-            </a:r>
-            <a:r>
-              <a:rPr lang="pl-PL" sz="2000" b="1" dirty="0" smtClean="0">
-                <a:solidFill>
-                  <a:sysClr val="windowText" lastClr="000000"/>
-                </a:solidFill>
-                <a:latin typeface="+mj-lt"/>
-                <a:cs typeface="Courier New" pitchFamily="49" charset="0"/>
-              </a:rPr>
-              <a:t>i </a:t>
-            </a:r>
-            <a:r>
-              <a:rPr lang="pl-PL" sz="2000" b="1" dirty="0" smtClean="0">
-                <a:solidFill>
-                  <a:sysClr val="windowText" lastClr="000000"/>
-                </a:solidFill>
-                <a:latin typeface="+mj-lt"/>
-                <a:cs typeface="Courier New" pitchFamily="49" charset="0"/>
-              </a:rPr>
-              <a:t>czujniki temperatury.</a:t>
+              <a:t>Budujemy własny czujnik linii</a:t>
             </a:r>
           </a:p>
           <a:p>
@@ -8442,7 +8095,7 @@
                 <a:spcPct val="20000"/>
               </a:spcBef>
               <a:spcAft>
-                <a:spcPts val="1200"/>
+                <a:spcPts val="600"/>
               </a:spcAft>
               <a:buClrTx/>
               <a:buFont typeface="+mj-lt"/>
@@ -8456,15 +8109,34 @@
                 <a:latin typeface="+mj-lt"/>
                 <a:cs typeface="Courier New" pitchFamily="49" charset="0"/>
               </a:rPr>
-              <a:t>Rejestr przesuwny i wyświetlaczach LED 7-segmentowy.</a:t>
-            </a:r>
-            <a:endParaRPr lang="pl-PL" sz="2000" b="1" dirty="0" smtClean="0">
-              <a:solidFill>
-                <a:sysClr val="windowText" lastClr="000000"/>
-              </a:solidFill>
-              <a:latin typeface="+mj-lt"/>
-              <a:cs typeface="Courier New" pitchFamily="49" charset="0"/>
-            </a:endParaRPr>
+              <a:t>Praca w zespołach</a:t>
+            </a:r>
+          </a:p>
+          <a:p>
+            <a:pPr marL="457200" indent="-457200" defTabSz="457200">
+              <a:lnSpc>
+                <a:spcPct val="100000"/>
+              </a:lnSpc>
+              <a:spcBef>
+                <a:spcPct val="20000"/>
+              </a:spcBef>
+              <a:spcAft>
+                <a:spcPts val="600"/>
+              </a:spcAft>
+              <a:buClrTx/>
+              <a:buFont typeface="+mj-lt"/>
+              <a:buAutoNum type="arabicPeriod"/>
+            </a:pPr>
+            <a:r>
+              <a:rPr lang="pl-PL" sz="2000" b="1" dirty="0" smtClean="0">
+                <a:solidFill>
+                  <a:sysClr val="windowText" lastClr="000000"/>
+                </a:solidFill>
+                <a:latin typeface="+mj-lt"/>
+                <a:cs typeface="Courier New" pitchFamily="49" charset="0"/>
+              </a:rPr>
+              <a:t>Zawody</a:t>
+            </a:r>
           </a:p>
         </p:txBody>
       </p:sp>
@@ -8613,12 +8285,6 @@
 </file>
 
 <file path=ppt/tags/tag20.xml><?xml version="1.0" encoding="utf-8"?>
-<p:tagLst xmlns:a="http://schemas.openxmlformats.org/drawingml/2006/main" xmlns:r="http://schemas.openxmlformats.org/officeDocument/2006/relationships" xmlns:p="http://schemas.openxmlformats.org/presentationml/2006/main">
-  <p:tag name="THINKCELLSHAPEDONOTDELETE" val="prQEede2w9UymXTZvuecCog"/>
-</p:tagLst>
-</file>
-
-<file path=ppt/tags/tag21.xml><?xml version="1.0" encoding="utf-8"?>
 <p:tagLst xmlns:a="http://schemas.openxmlformats.org/drawingml/2006/main" xmlns:r="http://schemas.openxmlformats.org/officeDocument/2006/relationships" xmlns:p="http://schemas.openxmlformats.org/presentationml/2006/main">
   <p:tag name="THINKCELLSHAPEDONOTDELETE" val="prQEede2w9UymXTZvuecCog"/>
 </p:tagLst>

</xml_diff>